<commit_message>
Fixed some spelling mistakes and formatting;
</commit_message>
<xml_diff>
--- a/documents/Sentia Assessment - Cool Project.pptx
+++ b/documents/Sentia Assessment - Cool Project.pptx
@@ -26636,7 +26636,7 @@
         <p:spPr>
           <a:xfrm>
             <a:off x="3212" y="2859"/>
-            <a:ext cx="8596668" cy="624675"/>
+            <a:ext cx="8596800" cy="624600"/>
           </a:xfrm>
           <a:prstGeom prst="rect">
             <a:avLst/>
@@ -26648,7 +26648,7 @@
         </p:spPr>
         <p:txBody>
           <a:bodyPr anchorCtr="0" anchor="ctr" bIns="45700" lIns="91425" spcFirstLastPara="1" rIns="91425" wrap="square" tIns="45700">
-            <a:normAutofit/>
+            <a:noAutofit/>
           </a:bodyPr>
           <a:lstStyle/>
           <a:p>
@@ -26691,7 +26691,7 @@
         <p:spPr>
           <a:xfrm>
             <a:off x="-10886" y="516176"/>
-            <a:ext cx="7175174" cy="0"/>
+            <a:ext cx="7175100" cy="0"/>
           </a:xfrm>
           <a:prstGeom prst="straightConnector1">
             <a:avLst/>
@@ -26717,7 +26717,7 @@
         <p:spPr>
           <a:xfrm>
             <a:off x="323535" y="654312"/>
-            <a:ext cx="3293333" cy="297554"/>
+            <a:ext cx="3293400" cy="297600"/>
           </a:xfrm>
           <a:prstGeom prst="round2SameRect">
             <a:avLst>
@@ -26793,7 +26793,7 @@
         <p:spPr>
           <a:xfrm>
             <a:off x="3707912" y="661499"/>
-            <a:ext cx="1638606" cy="297554"/>
+            <a:ext cx="1638600" cy="297600"/>
           </a:xfrm>
           <a:prstGeom prst="round2SameRect">
             <a:avLst>
@@ -26860,7 +26860,7 @@
         <p:spPr>
           <a:xfrm>
             <a:off x="323535" y="1017017"/>
-            <a:ext cx="3293333" cy="383782"/>
+            <a:ext cx="3293400" cy="383700"/>
           </a:xfrm>
           <a:prstGeom prst="roundRect">
             <a:avLst>
@@ -26938,7 +26938,7 @@
         <p:spPr>
           <a:xfrm>
             <a:off x="323535" y="1437691"/>
-            <a:ext cx="3293333" cy="383782"/>
+            <a:ext cx="3293400" cy="383700"/>
           </a:xfrm>
           <a:prstGeom prst="roundRect">
             <a:avLst>
@@ -27016,7 +27016,7 @@
         <p:spPr>
           <a:xfrm>
             <a:off x="323535" y="1858365"/>
-            <a:ext cx="3293333" cy="383782"/>
+            <a:ext cx="3293400" cy="383700"/>
           </a:xfrm>
           <a:prstGeom prst="roundRect">
             <a:avLst>
@@ -27094,7 +27094,7 @@
         <p:spPr>
           <a:xfrm>
             <a:off x="323535" y="2279039"/>
-            <a:ext cx="3293333" cy="383782"/>
+            <a:ext cx="3293400" cy="383700"/>
           </a:xfrm>
           <a:prstGeom prst="roundRect">
             <a:avLst>
@@ -27172,7 +27172,331 @@
         <p:spPr>
           <a:xfrm>
             <a:off x="323535" y="2699713"/>
-            <a:ext cx="3293333" cy="383782"/>
+            <a:ext cx="3293400" cy="383700"/>
+          </a:xfrm>
+          <a:prstGeom prst="roundRect">
+            <a:avLst>
+              <a:gd fmla="val 16667" name="adj"/>
+            </a:avLst>
+          </a:prstGeom>
+          <a:solidFill>
+            <a:schemeClr val="lt1"/>
+          </a:solidFill>
+          <a:ln cap="flat" cmpd="sng" w="9525">
+            <a:solidFill>
+              <a:srgbClr val="D8D8D8"/>
+            </a:solidFill>
+            <a:prstDash val="solid"/>
+            <a:round/>
+            <a:headEnd len="sm" w="sm" type="none"/>
+            <a:tailEnd len="sm" w="sm" type="none"/>
+          </a:ln>
+          <a:effectLst>
+            <a:outerShdw blurRad="50800" rotWithShape="0" algn="t" dir="5400000" dist="38100">
+              <a:srgbClr val="000000">
+                <a:alpha val="40000"/>
+              </a:srgbClr>
+            </a:outerShdw>
+          </a:effectLst>
+        </p:spPr>
+        <p:txBody>
+          <a:bodyPr anchorCtr="0" anchor="ctr" bIns="45700" lIns="91425" spcFirstLastPara="1" rIns="91425" wrap="square" tIns="45700">
+            <a:noAutofit/>
+          </a:bodyPr>
+          <a:lstStyle/>
+          <a:p>
+            <a:pPr indent="0" lvl="0" marL="0" rtl="0" algn="l">
+              <a:lnSpc>
+                <a:spcPct val="115000"/>
+              </a:lnSpc>
+              <a:spcBef>
+                <a:spcPts val="0"/>
+              </a:spcBef>
+              <a:spcAft>
+                <a:spcPts val="0"/>
+              </a:spcAft>
+              <a:buNone/>
+            </a:pPr>
+            <a:r>
+              <a:rPr lang="pt-BR" sz="1100">
+                <a:solidFill>
+                  <a:schemeClr val="dk1"/>
+                </a:solidFill>
+                <a:latin typeface="Verdana"/>
+                <a:ea typeface="Verdana"/>
+                <a:cs typeface="Verdana"/>
+                <a:sym typeface="Verdana"/>
+              </a:rPr>
+              <a:t>Front Door with 1 routing rule and 100 GB outbound data transfer</a:t>
+            </a:r>
+            <a:endParaRPr sz="1100">
+              <a:solidFill>
+                <a:schemeClr val="dk1"/>
+              </a:solidFill>
+              <a:latin typeface="Verdana"/>
+              <a:ea typeface="Verdana"/>
+              <a:cs typeface="Verdana"/>
+              <a:sym typeface="Verdana"/>
+            </a:endParaRPr>
+          </a:p>
+        </p:txBody>
+      </p:sp>
+      <p:sp>
+        <p:nvSpPr>
+          <p:cNvPr id="276" name="Google Shape;276;p16"/>
+          <p:cNvSpPr/>
+          <p:nvPr/>
+        </p:nvSpPr>
+        <p:spPr>
+          <a:xfrm>
+            <a:off x="323535" y="3120387"/>
+            <a:ext cx="3293400" cy="383700"/>
+          </a:xfrm>
+          <a:prstGeom prst="roundRect">
+            <a:avLst>
+              <a:gd fmla="val 16667" name="adj"/>
+            </a:avLst>
+          </a:prstGeom>
+          <a:solidFill>
+            <a:schemeClr val="lt1"/>
+          </a:solidFill>
+          <a:ln cap="flat" cmpd="sng" w="9525">
+            <a:solidFill>
+              <a:srgbClr val="D8D8D8"/>
+            </a:solidFill>
+            <a:prstDash val="solid"/>
+            <a:round/>
+            <a:headEnd len="sm" w="sm" type="none"/>
+            <a:tailEnd len="sm" w="sm" type="none"/>
+          </a:ln>
+          <a:effectLst>
+            <a:outerShdw blurRad="50800" rotWithShape="0" algn="t" dir="5400000" dist="38100">
+              <a:srgbClr val="000000">
+                <a:alpha val="40000"/>
+              </a:srgbClr>
+            </a:outerShdw>
+          </a:effectLst>
+        </p:spPr>
+        <p:txBody>
+          <a:bodyPr anchorCtr="0" anchor="ctr" bIns="45700" lIns="91425" spcFirstLastPara="1" rIns="91425" wrap="square" tIns="45700">
+            <a:noAutofit/>
+          </a:bodyPr>
+          <a:lstStyle/>
+          <a:p>
+            <a:pPr indent="0" lvl="0" marL="0" rtl="0" algn="l">
+              <a:lnSpc>
+                <a:spcPct val="115000"/>
+              </a:lnSpc>
+              <a:spcBef>
+                <a:spcPts val="0"/>
+              </a:spcBef>
+              <a:spcAft>
+                <a:spcPts val="0"/>
+              </a:spcAft>
+              <a:buClr>
+                <a:schemeClr val="dk1"/>
+              </a:buClr>
+              <a:buFont typeface="Arial"/>
+              <a:buNone/>
+            </a:pPr>
+            <a:r>
+              <a:rPr lang="pt-BR" sz="1100">
+                <a:solidFill>
+                  <a:srgbClr val="FF0000"/>
+                </a:solidFill>
+                <a:latin typeface="Verdana"/>
+                <a:ea typeface="Verdana"/>
+                <a:cs typeface="Verdana"/>
+                <a:sym typeface="Verdana"/>
+              </a:rPr>
+              <a:t>Total per highly available environment</a:t>
+            </a:r>
+            <a:endParaRPr sz="1100">
+              <a:solidFill>
+                <a:srgbClr val="FF0000"/>
+              </a:solidFill>
+              <a:latin typeface="Verdana"/>
+              <a:ea typeface="Verdana"/>
+              <a:cs typeface="Verdana"/>
+              <a:sym typeface="Verdana"/>
+            </a:endParaRPr>
+          </a:p>
+        </p:txBody>
+      </p:sp>
+      <p:sp>
+        <p:nvSpPr>
+          <p:cNvPr id="277" name="Google Shape;277;p16"/>
+          <p:cNvSpPr/>
+          <p:nvPr/>
+        </p:nvSpPr>
+        <p:spPr>
+          <a:xfrm>
+            <a:off x="323535" y="3541061"/>
+            <a:ext cx="3293400" cy="383700"/>
+          </a:xfrm>
+          <a:prstGeom prst="roundRect">
+            <a:avLst>
+              <a:gd fmla="val 16667" name="adj"/>
+            </a:avLst>
+          </a:prstGeom>
+          <a:solidFill>
+            <a:schemeClr val="lt1"/>
+          </a:solidFill>
+          <a:ln cap="flat" cmpd="sng" w="9525">
+            <a:solidFill>
+              <a:srgbClr val="D8D8D8"/>
+            </a:solidFill>
+            <a:prstDash val="solid"/>
+            <a:round/>
+            <a:headEnd len="sm" w="sm" type="none"/>
+            <a:tailEnd len="sm" w="sm" type="none"/>
+          </a:ln>
+          <a:effectLst>
+            <a:outerShdw blurRad="50800" rotWithShape="0" algn="t" dir="5400000" dist="38100">
+              <a:srgbClr val="000000">
+                <a:alpha val="40000"/>
+              </a:srgbClr>
+            </a:outerShdw>
+          </a:effectLst>
+        </p:spPr>
+        <p:txBody>
+          <a:bodyPr anchorCtr="0" anchor="ctr" bIns="45700" lIns="91425" spcFirstLastPara="1" rIns="91425" wrap="square" tIns="45700">
+            <a:noAutofit/>
+          </a:bodyPr>
+          <a:lstStyle/>
+          <a:p>
+            <a:pPr indent="0" lvl="0" marL="0" rtl="0" algn="l">
+              <a:lnSpc>
+                <a:spcPct val="115000"/>
+              </a:lnSpc>
+              <a:spcBef>
+                <a:spcPts val="0"/>
+              </a:spcBef>
+              <a:spcAft>
+                <a:spcPts val="0"/>
+              </a:spcAft>
+              <a:buClr>
+                <a:schemeClr val="dk1"/>
+              </a:buClr>
+              <a:buFont typeface="Arial"/>
+              <a:buNone/>
+            </a:pPr>
+            <a:r>
+              <a:rPr lang="pt-BR" sz="1100">
+                <a:solidFill>
+                  <a:schemeClr val="dk1"/>
+                </a:solidFill>
+                <a:latin typeface="Verdana"/>
+                <a:ea typeface="Verdana"/>
+                <a:cs typeface="Verdana"/>
+                <a:sym typeface="Verdana"/>
+              </a:rPr>
+              <a:t>Azure for MySql with 2 vCore and 200gb storage space + GRS</a:t>
+            </a:r>
+            <a:endParaRPr sz="1100">
+              <a:solidFill>
+                <a:schemeClr val="dk1"/>
+              </a:solidFill>
+              <a:latin typeface="Verdana"/>
+              <a:ea typeface="Verdana"/>
+              <a:cs typeface="Verdana"/>
+              <a:sym typeface="Verdana"/>
+            </a:endParaRPr>
+          </a:p>
+        </p:txBody>
+      </p:sp>
+      <p:sp>
+        <p:nvSpPr>
+          <p:cNvPr id="278" name="Google Shape;278;p16"/>
+          <p:cNvSpPr/>
+          <p:nvPr/>
+        </p:nvSpPr>
+        <p:spPr>
+          <a:xfrm>
+            <a:off x="323535" y="3961735"/>
+            <a:ext cx="3293400" cy="383700"/>
+          </a:xfrm>
+          <a:prstGeom prst="roundRect">
+            <a:avLst>
+              <a:gd fmla="val 16667" name="adj"/>
+            </a:avLst>
+          </a:prstGeom>
+          <a:solidFill>
+            <a:schemeClr val="lt1"/>
+          </a:solidFill>
+          <a:ln cap="flat" cmpd="sng" w="9525">
+            <a:solidFill>
+              <a:srgbClr val="D8D8D8"/>
+            </a:solidFill>
+            <a:prstDash val="solid"/>
+            <a:round/>
+            <a:headEnd len="sm" w="sm" type="none"/>
+            <a:tailEnd len="sm" w="sm" type="none"/>
+          </a:ln>
+          <a:effectLst>
+            <a:outerShdw blurRad="50800" rotWithShape="0" algn="t" dir="5400000" dist="38100">
+              <a:srgbClr val="000000">
+                <a:alpha val="40000"/>
+              </a:srgbClr>
+            </a:outerShdw>
+          </a:effectLst>
+        </p:spPr>
+        <p:txBody>
+          <a:bodyPr anchorCtr="0" anchor="ctr" bIns="45700" lIns="91425" spcFirstLastPara="1" rIns="91425" wrap="square" tIns="45700">
+            <a:noAutofit/>
+          </a:bodyPr>
+          <a:lstStyle/>
+          <a:p>
+            <a:pPr indent="0" lvl="0" marL="0" rtl="0" algn="l">
+              <a:lnSpc>
+                <a:spcPct val="115000"/>
+              </a:lnSpc>
+              <a:spcBef>
+                <a:spcPts val="0"/>
+              </a:spcBef>
+              <a:spcAft>
+                <a:spcPts val="0"/>
+              </a:spcAft>
+              <a:buClr>
+                <a:schemeClr val="dk1"/>
+              </a:buClr>
+              <a:buFont typeface="Arial"/>
+              <a:buNone/>
+            </a:pPr>
+            <a:r>
+              <a:rPr lang="pt-BR" sz="1100">
+                <a:solidFill>
+                  <a:schemeClr val="dk1"/>
+                </a:solidFill>
+                <a:latin typeface="Verdana"/>
+                <a:ea typeface="Verdana"/>
+                <a:cs typeface="Verdana"/>
+                <a:sym typeface="Verdana"/>
+              </a:rPr>
+              <a:t>Standard Microsoft Support</a:t>
+            </a:r>
+            <a:endParaRPr sz="1100">
+              <a:solidFill>
+                <a:schemeClr val="dk1"/>
+              </a:solidFill>
+              <a:latin typeface="Verdana"/>
+              <a:ea typeface="Verdana"/>
+              <a:cs typeface="Verdana"/>
+              <a:sym typeface="Verdana"/>
+            </a:endParaRPr>
+          </a:p>
+        </p:txBody>
+      </p:sp>
+      <p:sp>
+        <p:nvSpPr>
+          <p:cNvPr id="279" name="Google Shape;279;p16"/>
+          <p:cNvSpPr/>
+          <p:nvPr/>
+        </p:nvSpPr>
+        <p:spPr>
+          <a:xfrm>
+            <a:off x="323535" y="4382412"/>
+            <a:ext cx="3293400" cy="383700"/>
           </a:xfrm>
           <a:prstGeom prst="roundRect">
             <a:avLst>
@@ -27227,330 +27551,6 @@
                 <a:cs typeface="Verdana"/>
                 <a:sym typeface="Verdana"/>
               </a:rPr>
-              <a:t>Total per highly available environment</a:t>
-            </a:r>
-            <a:endParaRPr sz="1100">
-              <a:solidFill>
-                <a:srgbClr val="FF0000"/>
-              </a:solidFill>
-              <a:latin typeface="Verdana"/>
-              <a:ea typeface="Verdana"/>
-              <a:cs typeface="Verdana"/>
-              <a:sym typeface="Verdana"/>
-            </a:endParaRPr>
-          </a:p>
-        </p:txBody>
-      </p:sp>
-      <p:sp>
-        <p:nvSpPr>
-          <p:cNvPr id="276" name="Google Shape;276;p16"/>
-          <p:cNvSpPr/>
-          <p:nvPr/>
-        </p:nvSpPr>
-        <p:spPr>
-          <a:xfrm>
-            <a:off x="323535" y="3120387"/>
-            <a:ext cx="3293333" cy="383782"/>
-          </a:xfrm>
-          <a:prstGeom prst="roundRect">
-            <a:avLst>
-              <a:gd fmla="val 16667" name="adj"/>
-            </a:avLst>
-          </a:prstGeom>
-          <a:solidFill>
-            <a:schemeClr val="lt1"/>
-          </a:solidFill>
-          <a:ln cap="flat" cmpd="sng" w="9525">
-            <a:solidFill>
-              <a:srgbClr val="D8D8D8"/>
-            </a:solidFill>
-            <a:prstDash val="solid"/>
-            <a:round/>
-            <a:headEnd len="sm" w="sm" type="none"/>
-            <a:tailEnd len="sm" w="sm" type="none"/>
-          </a:ln>
-          <a:effectLst>
-            <a:outerShdw blurRad="50800" rotWithShape="0" algn="t" dir="5400000" dist="38100">
-              <a:srgbClr val="000000">
-                <a:alpha val="40000"/>
-              </a:srgbClr>
-            </a:outerShdw>
-          </a:effectLst>
-        </p:spPr>
-        <p:txBody>
-          <a:bodyPr anchorCtr="0" anchor="ctr" bIns="45700" lIns="91425" spcFirstLastPara="1" rIns="91425" wrap="square" tIns="45700">
-            <a:noAutofit/>
-          </a:bodyPr>
-          <a:lstStyle/>
-          <a:p>
-            <a:pPr indent="0" lvl="0" marL="0" rtl="0" algn="l">
-              <a:lnSpc>
-                <a:spcPct val="115000"/>
-              </a:lnSpc>
-              <a:spcBef>
-                <a:spcPts val="0"/>
-              </a:spcBef>
-              <a:spcAft>
-                <a:spcPts val="0"/>
-              </a:spcAft>
-              <a:buClr>
-                <a:schemeClr val="dk1"/>
-              </a:buClr>
-              <a:buFont typeface="Arial"/>
-              <a:buNone/>
-            </a:pPr>
-            <a:r>
-              <a:rPr lang="pt-BR" sz="1100">
-                <a:solidFill>
-                  <a:schemeClr val="dk1"/>
-                </a:solidFill>
-                <a:latin typeface="Verdana"/>
-                <a:ea typeface="Verdana"/>
-                <a:cs typeface="Verdana"/>
-                <a:sym typeface="Verdana"/>
-              </a:rPr>
-              <a:t>Front Door with 1 routing rule and 100 GB outbound data transfer</a:t>
-            </a:r>
-            <a:endParaRPr sz="1100">
-              <a:solidFill>
-                <a:schemeClr val="dk1"/>
-              </a:solidFill>
-              <a:latin typeface="Verdana"/>
-              <a:ea typeface="Verdana"/>
-              <a:cs typeface="Verdana"/>
-              <a:sym typeface="Verdana"/>
-            </a:endParaRPr>
-          </a:p>
-        </p:txBody>
-      </p:sp>
-      <p:sp>
-        <p:nvSpPr>
-          <p:cNvPr id="277" name="Google Shape;277;p16"/>
-          <p:cNvSpPr/>
-          <p:nvPr/>
-        </p:nvSpPr>
-        <p:spPr>
-          <a:xfrm>
-            <a:off x="323535" y="3541061"/>
-            <a:ext cx="3293333" cy="383782"/>
-          </a:xfrm>
-          <a:prstGeom prst="roundRect">
-            <a:avLst>
-              <a:gd fmla="val 16667" name="adj"/>
-            </a:avLst>
-          </a:prstGeom>
-          <a:solidFill>
-            <a:schemeClr val="lt1"/>
-          </a:solidFill>
-          <a:ln cap="flat" cmpd="sng" w="9525">
-            <a:solidFill>
-              <a:srgbClr val="D8D8D8"/>
-            </a:solidFill>
-            <a:prstDash val="solid"/>
-            <a:round/>
-            <a:headEnd len="sm" w="sm" type="none"/>
-            <a:tailEnd len="sm" w="sm" type="none"/>
-          </a:ln>
-          <a:effectLst>
-            <a:outerShdw blurRad="50800" rotWithShape="0" algn="t" dir="5400000" dist="38100">
-              <a:srgbClr val="000000">
-                <a:alpha val="40000"/>
-              </a:srgbClr>
-            </a:outerShdw>
-          </a:effectLst>
-        </p:spPr>
-        <p:txBody>
-          <a:bodyPr anchorCtr="0" anchor="ctr" bIns="45700" lIns="91425" spcFirstLastPara="1" rIns="91425" wrap="square" tIns="45700">
-            <a:noAutofit/>
-          </a:bodyPr>
-          <a:lstStyle/>
-          <a:p>
-            <a:pPr indent="0" lvl="0" marL="0" rtl="0" algn="l">
-              <a:lnSpc>
-                <a:spcPct val="115000"/>
-              </a:lnSpc>
-              <a:spcBef>
-                <a:spcPts val="0"/>
-              </a:spcBef>
-              <a:spcAft>
-                <a:spcPts val="0"/>
-              </a:spcAft>
-              <a:buClr>
-                <a:schemeClr val="dk1"/>
-              </a:buClr>
-              <a:buFont typeface="Arial"/>
-              <a:buNone/>
-            </a:pPr>
-            <a:r>
-              <a:rPr lang="pt-BR" sz="1100">
-                <a:solidFill>
-                  <a:schemeClr val="dk1"/>
-                </a:solidFill>
-                <a:latin typeface="Verdana"/>
-                <a:ea typeface="Verdana"/>
-                <a:cs typeface="Verdana"/>
-                <a:sym typeface="Verdana"/>
-              </a:rPr>
-              <a:t>Azure for MySql with 2 vCore and 200gb storage space + GRS</a:t>
-            </a:r>
-            <a:endParaRPr sz="1100">
-              <a:solidFill>
-                <a:schemeClr val="dk1"/>
-              </a:solidFill>
-              <a:latin typeface="Verdana"/>
-              <a:ea typeface="Verdana"/>
-              <a:cs typeface="Verdana"/>
-              <a:sym typeface="Verdana"/>
-            </a:endParaRPr>
-          </a:p>
-        </p:txBody>
-      </p:sp>
-      <p:sp>
-        <p:nvSpPr>
-          <p:cNvPr id="278" name="Google Shape;278;p16"/>
-          <p:cNvSpPr/>
-          <p:nvPr/>
-        </p:nvSpPr>
-        <p:spPr>
-          <a:xfrm>
-            <a:off x="323535" y="3961735"/>
-            <a:ext cx="3293333" cy="383782"/>
-          </a:xfrm>
-          <a:prstGeom prst="roundRect">
-            <a:avLst>
-              <a:gd fmla="val 16667" name="adj"/>
-            </a:avLst>
-          </a:prstGeom>
-          <a:solidFill>
-            <a:schemeClr val="lt1"/>
-          </a:solidFill>
-          <a:ln cap="flat" cmpd="sng" w="9525">
-            <a:solidFill>
-              <a:srgbClr val="D8D8D8"/>
-            </a:solidFill>
-            <a:prstDash val="solid"/>
-            <a:round/>
-            <a:headEnd len="sm" w="sm" type="none"/>
-            <a:tailEnd len="sm" w="sm" type="none"/>
-          </a:ln>
-          <a:effectLst>
-            <a:outerShdw blurRad="50800" rotWithShape="0" algn="t" dir="5400000" dist="38100">
-              <a:srgbClr val="000000">
-                <a:alpha val="40000"/>
-              </a:srgbClr>
-            </a:outerShdw>
-          </a:effectLst>
-        </p:spPr>
-        <p:txBody>
-          <a:bodyPr anchorCtr="0" anchor="ctr" bIns="45700" lIns="91425" spcFirstLastPara="1" rIns="91425" wrap="square" tIns="45700">
-            <a:noAutofit/>
-          </a:bodyPr>
-          <a:lstStyle/>
-          <a:p>
-            <a:pPr indent="0" lvl="0" marL="0" rtl="0" algn="l">
-              <a:lnSpc>
-                <a:spcPct val="115000"/>
-              </a:lnSpc>
-              <a:spcBef>
-                <a:spcPts val="0"/>
-              </a:spcBef>
-              <a:spcAft>
-                <a:spcPts val="0"/>
-              </a:spcAft>
-              <a:buClr>
-                <a:schemeClr val="dk1"/>
-              </a:buClr>
-              <a:buFont typeface="Arial"/>
-              <a:buNone/>
-            </a:pPr>
-            <a:r>
-              <a:rPr lang="pt-BR" sz="1100">
-                <a:solidFill>
-                  <a:schemeClr val="dk1"/>
-                </a:solidFill>
-                <a:latin typeface="Verdana"/>
-                <a:ea typeface="Verdana"/>
-                <a:cs typeface="Verdana"/>
-                <a:sym typeface="Verdana"/>
-              </a:rPr>
-              <a:t>Standard Microsoft Support</a:t>
-            </a:r>
-            <a:endParaRPr sz="1100">
-              <a:solidFill>
-                <a:schemeClr val="dk1"/>
-              </a:solidFill>
-              <a:latin typeface="Verdana"/>
-              <a:ea typeface="Verdana"/>
-              <a:cs typeface="Verdana"/>
-              <a:sym typeface="Verdana"/>
-            </a:endParaRPr>
-          </a:p>
-        </p:txBody>
-      </p:sp>
-      <p:sp>
-        <p:nvSpPr>
-          <p:cNvPr id="279" name="Google Shape;279;p16"/>
-          <p:cNvSpPr/>
-          <p:nvPr/>
-        </p:nvSpPr>
-        <p:spPr>
-          <a:xfrm>
-            <a:off x="323535" y="4382412"/>
-            <a:ext cx="3293333" cy="383782"/>
-          </a:xfrm>
-          <a:prstGeom prst="roundRect">
-            <a:avLst>
-              <a:gd fmla="val 16667" name="adj"/>
-            </a:avLst>
-          </a:prstGeom>
-          <a:solidFill>
-            <a:schemeClr val="lt1"/>
-          </a:solidFill>
-          <a:ln cap="flat" cmpd="sng" w="9525">
-            <a:solidFill>
-              <a:srgbClr val="D8D8D8"/>
-            </a:solidFill>
-            <a:prstDash val="solid"/>
-            <a:round/>
-            <a:headEnd len="sm" w="sm" type="none"/>
-            <a:tailEnd len="sm" w="sm" type="none"/>
-          </a:ln>
-          <a:effectLst>
-            <a:outerShdw blurRad="50800" rotWithShape="0" algn="t" dir="5400000" dist="38100">
-              <a:srgbClr val="000000">
-                <a:alpha val="40000"/>
-              </a:srgbClr>
-            </a:outerShdw>
-          </a:effectLst>
-        </p:spPr>
-        <p:txBody>
-          <a:bodyPr anchorCtr="0" anchor="ctr" bIns="45700" lIns="91425" spcFirstLastPara="1" rIns="91425" wrap="square" tIns="45700">
-            <a:noAutofit/>
-          </a:bodyPr>
-          <a:lstStyle/>
-          <a:p>
-            <a:pPr indent="0" lvl="0" marL="0" marR="0" rtl="0" algn="l">
-              <a:lnSpc>
-                <a:spcPct val="115000"/>
-              </a:lnSpc>
-              <a:spcBef>
-                <a:spcPts val="0"/>
-              </a:spcBef>
-              <a:spcAft>
-                <a:spcPts val="0"/>
-              </a:spcAft>
-              <a:buNone/>
-            </a:pPr>
-            <a:r>
-              <a:rPr lang="pt-BR" sz="1100">
-                <a:solidFill>
-                  <a:srgbClr val="FF0000"/>
-                </a:solidFill>
-                <a:latin typeface="Verdana"/>
-                <a:ea typeface="Verdana"/>
-                <a:cs typeface="Verdana"/>
-                <a:sym typeface="Verdana"/>
-              </a:rPr>
               <a:t>Total per environment + Shared resources costs</a:t>
             </a:r>
             <a:endParaRPr sz="1100">
@@ -27574,7 +27574,7 @@
         <p:spPr>
           <a:xfrm>
             <a:off x="3699851" y="1017017"/>
-            <a:ext cx="1646667" cy="383782"/>
+            <a:ext cx="1646700" cy="383700"/>
           </a:xfrm>
           <a:prstGeom prst="roundRect">
             <a:avLst>
@@ -27643,7 +27643,7 @@
         <p:spPr>
           <a:xfrm>
             <a:off x="3699851" y="1437691"/>
-            <a:ext cx="1646667" cy="383782"/>
+            <a:ext cx="1646700" cy="383700"/>
           </a:xfrm>
           <a:prstGeom prst="roundRect">
             <a:avLst>
@@ -27712,7 +27712,7 @@
         <p:spPr>
           <a:xfrm>
             <a:off x="3699851" y="1858365"/>
-            <a:ext cx="1646667" cy="383782"/>
+            <a:ext cx="1646700" cy="383700"/>
           </a:xfrm>
           <a:prstGeom prst="roundRect">
             <a:avLst>
@@ -27781,7 +27781,7 @@
         <p:spPr>
           <a:xfrm>
             <a:off x="3699851" y="2279039"/>
-            <a:ext cx="1646667" cy="383782"/>
+            <a:ext cx="1646700" cy="383700"/>
           </a:xfrm>
           <a:prstGeom prst="roundRect">
             <a:avLst>
@@ -27850,7 +27850,7 @@
         <p:spPr>
           <a:xfrm>
             <a:off x="3699851" y="2699713"/>
-            <a:ext cx="1646667" cy="383782"/>
+            <a:ext cx="1646700" cy="383700"/>
           </a:xfrm>
           <a:prstGeom prst="roundRect">
             <a:avLst>
@@ -27919,7 +27919,76 @@
         <p:spPr>
           <a:xfrm>
             <a:off x="3699851" y="3120387"/>
-            <a:ext cx="1646667" cy="383782"/>
+            <a:ext cx="1646700" cy="383700"/>
+          </a:xfrm>
+          <a:prstGeom prst="roundRect">
+            <a:avLst>
+              <a:gd fmla="val 16667" name="adj"/>
+            </a:avLst>
+          </a:prstGeom>
+          <a:solidFill>
+            <a:schemeClr val="lt1"/>
+          </a:solidFill>
+          <a:ln cap="flat" cmpd="sng" w="9525">
+            <a:solidFill>
+              <a:srgbClr val="D8D8D8"/>
+            </a:solidFill>
+            <a:prstDash val="solid"/>
+            <a:round/>
+            <a:headEnd len="sm" w="sm" type="none"/>
+            <a:tailEnd len="sm" w="sm" type="none"/>
+          </a:ln>
+          <a:effectLst>
+            <a:outerShdw blurRad="50800" rotWithShape="0" algn="t" dir="5400000" dist="38100">
+              <a:srgbClr val="000000">
+                <a:alpha val="40000"/>
+              </a:srgbClr>
+            </a:outerShdw>
+          </a:effectLst>
+        </p:spPr>
+        <p:txBody>
+          <a:bodyPr anchorCtr="0" anchor="ctr" bIns="45700" lIns="91425" spcFirstLastPara="1" rIns="91425" wrap="square" tIns="45700">
+            <a:noAutofit/>
+          </a:bodyPr>
+          <a:lstStyle/>
+          <a:p>
+            <a:pPr indent="0" lvl="0" marL="0" rtl="0" algn="ctr">
+              <a:lnSpc>
+                <a:spcPct val="115000"/>
+              </a:lnSpc>
+              <a:spcBef>
+                <a:spcPts val="0"/>
+              </a:spcBef>
+              <a:spcAft>
+                <a:spcPts val="0"/>
+              </a:spcAft>
+              <a:buNone/>
+            </a:pPr>
+            <a:r>
+              <a:t/>
+            </a:r>
+            <a:endParaRPr sz="1100">
+              <a:solidFill>
+                <a:srgbClr val="FF0000"/>
+              </a:solidFill>
+              <a:latin typeface="Verdana"/>
+              <a:ea typeface="Verdana"/>
+              <a:cs typeface="Verdana"/>
+              <a:sym typeface="Verdana"/>
+            </a:endParaRPr>
+          </a:p>
+        </p:txBody>
+      </p:sp>
+      <p:sp>
+        <p:nvSpPr>
+          <p:cNvPr id="286" name="Google Shape;286;p16"/>
+          <p:cNvSpPr/>
+          <p:nvPr/>
+        </p:nvSpPr>
+        <p:spPr>
+          <a:xfrm>
+            <a:off x="3699851" y="3541061"/>
+            <a:ext cx="1646700" cy="383700"/>
           </a:xfrm>
           <a:prstGeom prst="roundRect">
             <a:avLst>
@@ -27981,14 +28050,14 @@
       </p:sp>
       <p:sp>
         <p:nvSpPr>
-          <p:cNvPr id="286" name="Google Shape;286;p16"/>
+          <p:cNvPr id="287" name="Google Shape;287;p16"/>
           <p:cNvSpPr/>
           <p:nvPr/>
         </p:nvSpPr>
         <p:spPr>
           <a:xfrm>
-            <a:off x="3699851" y="3541061"/>
-            <a:ext cx="1646667" cy="383782"/>
+            <a:off x="3699851" y="3961735"/>
+            <a:ext cx="1646700" cy="383700"/>
           </a:xfrm>
           <a:prstGeom prst="roundRect">
             <a:avLst>
@@ -28050,14 +28119,14 @@
       </p:sp>
       <p:sp>
         <p:nvSpPr>
-          <p:cNvPr id="287" name="Google Shape;287;p16"/>
+          <p:cNvPr id="288" name="Google Shape;288;p16"/>
           <p:cNvSpPr/>
           <p:nvPr/>
         </p:nvSpPr>
         <p:spPr>
           <a:xfrm>
-            <a:off x="3699851" y="3961735"/>
-            <a:ext cx="1646667" cy="383782"/>
+            <a:off x="3699851" y="4382412"/>
+            <a:ext cx="1646700" cy="383700"/>
           </a:xfrm>
           <a:prstGeom prst="roundRect">
             <a:avLst>
@@ -28119,14 +28188,90 @@
       </p:sp>
       <p:sp>
         <p:nvSpPr>
-          <p:cNvPr id="288" name="Google Shape;288;p16"/>
+          <p:cNvPr id="289" name="Google Shape;289;p16"/>
           <p:cNvSpPr/>
           <p:nvPr/>
         </p:nvSpPr>
         <p:spPr>
           <a:xfrm>
-            <a:off x="3699851" y="4382412"/>
-            <a:ext cx="1646667" cy="383782"/>
+            <a:off x="5457997" y="661499"/>
+            <a:ext cx="1638600" cy="297600"/>
+          </a:xfrm>
+          <a:prstGeom prst="round2SameRect">
+            <a:avLst>
+              <a:gd fmla="val 16667" name="adj1"/>
+              <a:gd fmla="val 0" name="adj2"/>
+            </a:avLst>
+          </a:prstGeom>
+          <a:solidFill>
+            <a:schemeClr val="lt1"/>
+          </a:solidFill>
+          <a:ln cap="rnd" cmpd="sng" w="19050">
+            <a:solidFill>
+              <a:srgbClr val="BFBFBF"/>
+            </a:solidFill>
+            <a:prstDash val="solid"/>
+            <a:round/>
+            <a:headEnd len="sm" w="sm" type="none"/>
+            <a:tailEnd len="sm" w="sm" type="none"/>
+          </a:ln>
+          <a:effectLst>
+            <a:outerShdw blurRad="50800" rotWithShape="0" algn="t" dir="5400000" dist="38100">
+              <a:srgbClr val="000000">
+                <a:alpha val="40000"/>
+              </a:srgbClr>
+            </a:outerShdw>
+          </a:effectLst>
+        </p:spPr>
+        <p:txBody>
+          <a:bodyPr anchorCtr="0" anchor="ctr" bIns="45700" lIns="91425" spcFirstLastPara="1" rIns="91425" wrap="square" tIns="45700">
+            <a:noAutofit/>
+          </a:bodyPr>
+          <a:lstStyle/>
+          <a:p>
+            <a:pPr indent="0" lvl="0" marL="0" marR="0" rtl="0" algn="ctr">
+              <a:spcBef>
+                <a:spcPts val="0"/>
+              </a:spcBef>
+              <a:spcAft>
+                <a:spcPts val="0"/>
+              </a:spcAft>
+              <a:buNone/>
+            </a:pPr>
+            <a:r>
+              <a:rPr lang="pt-BR">
+                <a:solidFill>
+                  <a:schemeClr val="dk1"/>
+                </a:solidFill>
+                <a:latin typeface="Verdana"/>
+                <a:ea typeface="Verdana"/>
+                <a:cs typeface="Verdana"/>
+                <a:sym typeface="Verdana"/>
+              </a:rPr>
+              <a:t>Cost</a:t>
+            </a:r>
+            <a:endParaRPr b="1" sz="1400">
+              <a:solidFill>
+                <a:schemeClr val="dk1"/>
+              </a:solidFill>
+              <a:latin typeface="Verdana"/>
+              <a:ea typeface="Verdana"/>
+              <a:cs typeface="Verdana"/>
+              <a:sym typeface="Verdana"/>
+            </a:endParaRPr>
+          </a:p>
+        </p:txBody>
+      </p:sp>
+      <p:sp>
+        <p:nvSpPr>
+          <p:cNvPr id="290" name="Google Shape;290;p16"/>
+          <p:cNvSpPr/>
+          <p:nvPr/>
+        </p:nvSpPr>
+        <p:spPr>
+          <a:xfrm>
+            <a:off x="5449936" y="1017017"/>
+            <a:ext cx="1646700" cy="383700"/>
           </a:xfrm>
           <a:prstGeom prst="roundRect">
             <a:avLst>
@@ -28172,7 +28317,16 @@
               <a:buNone/>
             </a:pPr>
             <a:r>
-              <a:t/>
+              <a:rPr lang="pt-BR" sz="1100">
+                <a:solidFill>
+                  <a:schemeClr val="dk1"/>
+                </a:solidFill>
+                <a:latin typeface="Verdana"/>
+                <a:ea typeface="Verdana"/>
+                <a:cs typeface="Verdana"/>
+                <a:sym typeface="Verdana"/>
+              </a:rPr>
+              <a:t>7.84</a:t>
             </a:r>
             <a:endParaRPr sz="1100">
               <a:solidFill>
@@ -28188,90 +28342,14 @@
       </p:sp>
       <p:sp>
         <p:nvSpPr>
-          <p:cNvPr id="289" name="Google Shape;289;p16"/>
+          <p:cNvPr id="291" name="Google Shape;291;p16"/>
           <p:cNvSpPr/>
           <p:nvPr/>
         </p:nvSpPr>
         <p:spPr>
           <a:xfrm>
-            <a:off x="5457997" y="661499"/>
-            <a:ext cx="1638606" cy="297554"/>
-          </a:xfrm>
-          <a:prstGeom prst="round2SameRect">
-            <a:avLst>
-              <a:gd fmla="val 16667" name="adj1"/>
-              <a:gd fmla="val 0" name="adj2"/>
-            </a:avLst>
-          </a:prstGeom>
-          <a:solidFill>
-            <a:schemeClr val="lt1"/>
-          </a:solidFill>
-          <a:ln cap="rnd" cmpd="sng" w="19050">
-            <a:solidFill>
-              <a:srgbClr val="BFBFBF"/>
-            </a:solidFill>
-            <a:prstDash val="solid"/>
-            <a:round/>
-            <a:headEnd len="sm" w="sm" type="none"/>
-            <a:tailEnd len="sm" w="sm" type="none"/>
-          </a:ln>
-          <a:effectLst>
-            <a:outerShdw blurRad="50800" rotWithShape="0" algn="t" dir="5400000" dist="38100">
-              <a:srgbClr val="000000">
-                <a:alpha val="40000"/>
-              </a:srgbClr>
-            </a:outerShdw>
-          </a:effectLst>
-        </p:spPr>
-        <p:txBody>
-          <a:bodyPr anchorCtr="0" anchor="ctr" bIns="45700" lIns="91425" spcFirstLastPara="1" rIns="91425" wrap="square" tIns="45700">
-            <a:noAutofit/>
-          </a:bodyPr>
-          <a:lstStyle/>
-          <a:p>
-            <a:pPr indent="0" lvl="0" marL="0" marR="0" rtl="0" algn="ctr">
-              <a:spcBef>
-                <a:spcPts val="0"/>
-              </a:spcBef>
-              <a:spcAft>
-                <a:spcPts val="0"/>
-              </a:spcAft>
-              <a:buNone/>
-            </a:pPr>
-            <a:r>
-              <a:rPr lang="pt-BR">
-                <a:solidFill>
-                  <a:schemeClr val="dk1"/>
-                </a:solidFill>
-                <a:latin typeface="Verdana"/>
-                <a:ea typeface="Verdana"/>
-                <a:cs typeface="Verdana"/>
-                <a:sym typeface="Verdana"/>
-              </a:rPr>
-              <a:t>Cost</a:t>
-            </a:r>
-            <a:endParaRPr b="1" sz="1400">
-              <a:solidFill>
-                <a:schemeClr val="dk1"/>
-              </a:solidFill>
-              <a:latin typeface="Verdana"/>
-              <a:ea typeface="Verdana"/>
-              <a:cs typeface="Verdana"/>
-              <a:sym typeface="Verdana"/>
-            </a:endParaRPr>
-          </a:p>
-        </p:txBody>
-      </p:sp>
-      <p:sp>
-        <p:nvSpPr>
-          <p:cNvPr id="290" name="Google Shape;290;p16"/>
-          <p:cNvSpPr/>
-          <p:nvPr/>
-        </p:nvSpPr>
-        <p:spPr>
-          <a:xfrm>
-            <a:off x="5449936" y="1017017"/>
-            <a:ext cx="1646667" cy="383782"/>
+            <a:off x="5449936" y="1437691"/>
+            <a:ext cx="1646700" cy="383700"/>
           </a:xfrm>
           <a:prstGeom prst="roundRect">
             <a:avLst>
@@ -28326,7 +28404,7 @@
                 <a:cs typeface="Verdana"/>
                 <a:sym typeface="Verdana"/>
               </a:rPr>
-              <a:t>7.84</a:t>
+              <a:t>148.80</a:t>
             </a:r>
             <a:endParaRPr sz="1100">
               <a:solidFill>
@@ -28342,14 +28420,14 @@
       </p:sp>
       <p:sp>
         <p:nvSpPr>
-          <p:cNvPr id="291" name="Google Shape;291;p16"/>
+          <p:cNvPr id="292" name="Google Shape;292;p16"/>
           <p:cNvSpPr/>
           <p:nvPr/>
         </p:nvSpPr>
         <p:spPr>
           <a:xfrm>
-            <a:off x="5449936" y="1437691"/>
-            <a:ext cx="1646667" cy="383782"/>
+            <a:off x="5449936" y="1858365"/>
+            <a:ext cx="1646700" cy="383700"/>
           </a:xfrm>
           <a:prstGeom prst="roundRect">
             <a:avLst>
@@ -28404,7 +28482,7 @@
                 <a:cs typeface="Verdana"/>
                 <a:sym typeface="Verdana"/>
               </a:rPr>
-              <a:t>148.80</a:t>
+              <a:t>56.80</a:t>
             </a:r>
             <a:endParaRPr sz="1100">
               <a:solidFill>
@@ -28420,14 +28498,14 @@
       </p:sp>
       <p:sp>
         <p:nvSpPr>
-          <p:cNvPr id="292" name="Google Shape;292;p16"/>
+          <p:cNvPr id="293" name="Google Shape;293;p16"/>
           <p:cNvSpPr/>
           <p:nvPr/>
         </p:nvSpPr>
         <p:spPr>
           <a:xfrm>
-            <a:off x="5449936" y="1858365"/>
-            <a:ext cx="1646667" cy="383782"/>
+            <a:off x="5449936" y="2279039"/>
+            <a:ext cx="1646700" cy="383700"/>
           </a:xfrm>
           <a:prstGeom prst="roundRect">
             <a:avLst>
@@ -28482,84 +28560,6 @@
                 <a:cs typeface="Verdana"/>
                 <a:sym typeface="Verdana"/>
               </a:rPr>
-              <a:t>56.80</a:t>
-            </a:r>
-            <a:endParaRPr sz="1100">
-              <a:solidFill>
-                <a:schemeClr val="dk1"/>
-              </a:solidFill>
-              <a:latin typeface="Verdana"/>
-              <a:ea typeface="Verdana"/>
-              <a:cs typeface="Verdana"/>
-              <a:sym typeface="Verdana"/>
-            </a:endParaRPr>
-          </a:p>
-        </p:txBody>
-      </p:sp>
-      <p:sp>
-        <p:nvSpPr>
-          <p:cNvPr id="293" name="Google Shape;293;p16"/>
-          <p:cNvSpPr/>
-          <p:nvPr/>
-        </p:nvSpPr>
-        <p:spPr>
-          <a:xfrm>
-            <a:off x="5449936" y="2279039"/>
-            <a:ext cx="1646667" cy="383782"/>
-          </a:xfrm>
-          <a:prstGeom prst="roundRect">
-            <a:avLst>
-              <a:gd fmla="val 16667" name="adj"/>
-            </a:avLst>
-          </a:prstGeom>
-          <a:solidFill>
-            <a:schemeClr val="lt1"/>
-          </a:solidFill>
-          <a:ln cap="flat" cmpd="sng" w="9525">
-            <a:solidFill>
-              <a:srgbClr val="D8D8D8"/>
-            </a:solidFill>
-            <a:prstDash val="solid"/>
-            <a:round/>
-            <a:headEnd len="sm" w="sm" type="none"/>
-            <a:tailEnd len="sm" w="sm" type="none"/>
-          </a:ln>
-          <a:effectLst>
-            <a:outerShdw blurRad="50800" rotWithShape="0" algn="t" dir="5400000" dist="38100">
-              <a:srgbClr val="000000">
-                <a:alpha val="40000"/>
-              </a:srgbClr>
-            </a:outerShdw>
-          </a:effectLst>
-        </p:spPr>
-        <p:txBody>
-          <a:bodyPr anchorCtr="0" anchor="ctr" bIns="45700" lIns="91425" spcFirstLastPara="1" rIns="91425" wrap="square" tIns="45700">
-            <a:noAutofit/>
-          </a:bodyPr>
-          <a:lstStyle/>
-          <a:p>
-            <a:pPr indent="0" lvl="0" marL="0" marR="0" rtl="0" algn="ctr">
-              <a:lnSpc>
-                <a:spcPct val="115000"/>
-              </a:lnSpc>
-              <a:spcBef>
-                <a:spcPts val="0"/>
-              </a:spcBef>
-              <a:spcAft>
-                <a:spcPts val="0"/>
-              </a:spcAft>
-              <a:buNone/>
-            </a:pPr>
-            <a:r>
-              <a:rPr lang="pt-BR" sz="1100">
-                <a:solidFill>
-                  <a:schemeClr val="dk1"/>
-                </a:solidFill>
-                <a:latin typeface="Verdana"/>
-                <a:ea typeface="Verdana"/>
-                <a:cs typeface="Verdana"/>
-                <a:sym typeface="Verdana"/>
-              </a:rPr>
               <a:t>0,18</a:t>
             </a:r>
             <a:endParaRPr sz="1100">
@@ -28583,85 +28583,7 @@
         <p:spPr>
           <a:xfrm>
             <a:off x="5449936" y="2699713"/>
-            <a:ext cx="1646667" cy="383782"/>
-          </a:xfrm>
-          <a:prstGeom prst="roundRect">
-            <a:avLst>
-              <a:gd fmla="val 16667" name="adj"/>
-            </a:avLst>
-          </a:prstGeom>
-          <a:solidFill>
-            <a:schemeClr val="lt1"/>
-          </a:solidFill>
-          <a:ln cap="flat" cmpd="sng" w="9525">
-            <a:solidFill>
-              <a:srgbClr val="D8D8D8"/>
-            </a:solidFill>
-            <a:prstDash val="solid"/>
-            <a:round/>
-            <a:headEnd len="sm" w="sm" type="none"/>
-            <a:tailEnd len="sm" w="sm" type="none"/>
-          </a:ln>
-          <a:effectLst>
-            <a:outerShdw blurRad="50800" rotWithShape="0" algn="t" dir="5400000" dist="38100">
-              <a:srgbClr val="000000">
-                <a:alpha val="40000"/>
-              </a:srgbClr>
-            </a:outerShdw>
-          </a:effectLst>
-        </p:spPr>
-        <p:txBody>
-          <a:bodyPr anchorCtr="0" anchor="ctr" bIns="45700" lIns="91425" spcFirstLastPara="1" rIns="91425" wrap="square" tIns="45700">
-            <a:noAutofit/>
-          </a:bodyPr>
-          <a:lstStyle/>
-          <a:p>
-            <a:pPr indent="0" lvl="0" marL="0" marR="0" rtl="0" algn="ctr">
-              <a:lnSpc>
-                <a:spcPct val="115000"/>
-              </a:lnSpc>
-              <a:spcBef>
-                <a:spcPts val="0"/>
-              </a:spcBef>
-              <a:spcAft>
-                <a:spcPts val="0"/>
-              </a:spcAft>
-              <a:buNone/>
-            </a:pPr>
-            <a:r>
-              <a:rPr lang="pt-BR" sz="1100">
-                <a:solidFill>
-                  <a:srgbClr val="FF0000"/>
-                </a:solidFill>
-                <a:latin typeface="Verdana"/>
-                <a:ea typeface="Verdana"/>
-                <a:cs typeface="Verdana"/>
-                <a:sym typeface="Verdana"/>
-              </a:rPr>
-              <a:t>213,62</a:t>
-            </a:r>
-            <a:endParaRPr sz="1100">
-              <a:solidFill>
-                <a:srgbClr val="FF0000"/>
-              </a:solidFill>
-              <a:latin typeface="Verdana"/>
-              <a:ea typeface="Verdana"/>
-              <a:cs typeface="Verdana"/>
-              <a:sym typeface="Verdana"/>
-            </a:endParaRPr>
-          </a:p>
-        </p:txBody>
-      </p:sp>
-      <p:sp>
-        <p:nvSpPr>
-          <p:cNvPr id="295" name="Google Shape;295;p16"/>
-          <p:cNvSpPr/>
-          <p:nvPr/>
-        </p:nvSpPr>
-        <p:spPr>
-          <a:xfrm>
-            <a:off x="5449936" y="3120387"/>
-            <a:ext cx="1646667" cy="383782"/>
+            <a:ext cx="1646700" cy="383700"/>
           </a:xfrm>
           <a:prstGeom prst="roundRect">
             <a:avLst>
@@ -28704,10 +28626,6 @@
               <a:spcAft>
                 <a:spcPts val="0"/>
               </a:spcAft>
-              <a:buClr>
-                <a:schemeClr val="dk1"/>
-              </a:buClr>
-              <a:buFont typeface="Arial"/>
               <a:buNone/>
             </a:pPr>
             <a:r>
@@ -28736,6 +28654,88 @@
       </p:sp>
       <p:sp>
         <p:nvSpPr>
+          <p:cNvPr id="295" name="Google Shape;295;p16"/>
+          <p:cNvSpPr/>
+          <p:nvPr/>
+        </p:nvSpPr>
+        <p:spPr>
+          <a:xfrm>
+            <a:off x="5449936" y="3120387"/>
+            <a:ext cx="1646700" cy="383700"/>
+          </a:xfrm>
+          <a:prstGeom prst="roundRect">
+            <a:avLst>
+              <a:gd fmla="val 16667" name="adj"/>
+            </a:avLst>
+          </a:prstGeom>
+          <a:solidFill>
+            <a:schemeClr val="lt1"/>
+          </a:solidFill>
+          <a:ln cap="flat" cmpd="sng" w="9525">
+            <a:solidFill>
+              <a:srgbClr val="D8D8D8"/>
+            </a:solidFill>
+            <a:prstDash val="solid"/>
+            <a:round/>
+            <a:headEnd len="sm" w="sm" type="none"/>
+            <a:tailEnd len="sm" w="sm" type="none"/>
+          </a:ln>
+          <a:effectLst>
+            <a:outerShdw blurRad="50800" rotWithShape="0" algn="t" dir="5400000" dist="38100">
+              <a:srgbClr val="000000">
+                <a:alpha val="40000"/>
+              </a:srgbClr>
+            </a:outerShdw>
+          </a:effectLst>
+        </p:spPr>
+        <p:txBody>
+          <a:bodyPr anchorCtr="0" anchor="ctr" bIns="45700" lIns="91425" spcFirstLastPara="1" rIns="91425" wrap="square" tIns="45700">
+            <a:noAutofit/>
+          </a:bodyPr>
+          <a:lstStyle/>
+          <a:p>
+            <a:pPr indent="0" lvl="0" marL="0" rtl="0" algn="ctr">
+              <a:lnSpc>
+                <a:spcPct val="115000"/>
+              </a:lnSpc>
+              <a:spcBef>
+                <a:spcPts val="0"/>
+              </a:spcBef>
+              <a:spcAft>
+                <a:spcPts val="0"/>
+              </a:spcAft>
+              <a:buClr>
+                <a:schemeClr val="dk1"/>
+              </a:buClr>
+              <a:buFont typeface="Arial"/>
+              <a:buNone/>
+            </a:pPr>
+            <a:r>
+              <a:rPr lang="pt-BR" sz="1100">
+                <a:solidFill>
+                  <a:srgbClr val="FF0000"/>
+                </a:solidFill>
+                <a:latin typeface="Verdana"/>
+                <a:ea typeface="Verdana"/>
+                <a:cs typeface="Verdana"/>
+                <a:sym typeface="Verdana"/>
+              </a:rPr>
+              <a:t>253,14</a:t>
+            </a:r>
+            <a:endParaRPr sz="1100">
+              <a:solidFill>
+                <a:srgbClr val="FF0000"/>
+              </a:solidFill>
+              <a:latin typeface="Verdana"/>
+              <a:ea typeface="Verdana"/>
+              <a:cs typeface="Verdana"/>
+              <a:sym typeface="Verdana"/>
+            </a:endParaRPr>
+          </a:p>
+        </p:txBody>
+      </p:sp>
+      <p:sp>
+        <p:nvSpPr>
           <p:cNvPr id="296" name="Google Shape;296;p16"/>
           <p:cNvSpPr/>
           <p:nvPr/>
@@ -28743,7 +28743,7 @@
         <p:spPr>
           <a:xfrm>
             <a:off x="5449936" y="3541061"/>
-            <a:ext cx="1646667" cy="383782"/>
+            <a:ext cx="1646700" cy="383700"/>
           </a:xfrm>
           <a:prstGeom prst="roundRect">
             <a:avLst>
@@ -28907,7 +28907,7 @@
         <p:spPr>
           <a:xfrm>
             <a:off x="5449936" y="4382412"/>
-            <a:ext cx="1646667" cy="383782"/>
+            <a:ext cx="1646700" cy="383700"/>
           </a:xfrm>
           <a:prstGeom prst="roundRect">
             <a:avLst>
@@ -29443,7 +29443,7 @@
                 <a:cs typeface="Verdana"/>
                 <a:sym typeface="Verdana"/>
               </a:rPr>
-              <a:t>Current ARM Template design are not as good as I would like. There are too many parameter files and it feels a little inflexible sometime.</a:t>
+              <a:t>Current ARM Template design are not as good as I would like. There are too many parameter files and it feels a little inflexible sometimes.</a:t>
             </a:r>
             <a:endParaRPr/>
           </a:p>
@@ -30255,45 +30255,6 @@
             <a:noAutofit/>
           </a:bodyPr>
           <a:lstStyle/>
-          <a:p>
-            <a:pPr indent="-179999" lvl="0" marL="179999" rtl="0" algn="just">
-              <a:lnSpc>
-                <a:spcPct val="107142"/>
-              </a:lnSpc>
-              <a:spcBef>
-                <a:spcPts val="600"/>
-              </a:spcBef>
-              <a:spcAft>
-                <a:spcPts val="0"/>
-              </a:spcAft>
-              <a:buClr>
-                <a:schemeClr val="dk1"/>
-              </a:buClr>
-              <a:buSzPts val="1400"/>
-              <a:buChar char="•"/>
-            </a:pPr>
-            <a:r>
-              <a:rPr lang="pt-BR">
-                <a:solidFill>
-                  <a:schemeClr val="dk1"/>
-                </a:solidFill>
-                <a:latin typeface="Verdana"/>
-                <a:ea typeface="Verdana"/>
-                <a:cs typeface="Verdana"/>
-                <a:sym typeface="Verdana"/>
-              </a:rPr>
-              <a:t>The current design does not guarantee a real High Availability for the Database and Storage Accounts. </a:t>
-            </a:r>
-            <a:endParaRPr>
-              <a:solidFill>
-                <a:schemeClr val="dk1"/>
-              </a:solidFill>
-              <a:latin typeface="Verdana"/>
-              <a:ea typeface="Verdana"/>
-              <a:cs typeface="Verdana"/>
-              <a:sym typeface="Verdana"/>
-            </a:endParaRPr>
-          </a:p>
           <a:p>
             <a:pPr indent="-179999" lvl="0" marL="179999" rtl="0" algn="just">
               <a:lnSpc>

</xml_diff>